<commit_message>
lesson 2 deck created
</commit_message>
<xml_diff>
--- a/aws101-2.pptx
+++ b/aws101-2.pptx
@@ -5,7 +5,7 @@
     <p:sldMasterId id="2147483789" r:id="rId1"/>
   </p:sldMasterIdLst>
   <p:notesMasterIdLst>
-    <p:notesMasterId r:id="rId7"/>
+    <p:notesMasterId r:id="rId11"/>
   </p:notesMasterIdLst>
   <p:sldIdLst>
     <p:sldId id="256" r:id="rId2"/>
@@ -13,6 +13,10 @@
     <p:sldId id="305" r:id="rId4"/>
     <p:sldId id="308" r:id="rId5"/>
     <p:sldId id="309" r:id="rId6"/>
+    <p:sldId id="310" r:id="rId7"/>
+    <p:sldId id="311" r:id="rId8"/>
+    <p:sldId id="312" r:id="rId9"/>
+    <p:sldId id="313" r:id="rId10"/>
   </p:sldIdLst>
   <p:sldSz cx="12192000" cy="6858000"/>
   <p:notesSz cx="6858000" cy="9144000"/>
@@ -113,7 +117,7 @@
   </p:defaultTextStyle>
   <p:extLst>
     <p:ext uri="{EFAFB233-063F-42B5-8137-9DF3F51BA10A}">
-      <p15:sldGuideLst xmlns:p15="http://schemas.microsoft.com/office/powerpoint/2012/main" xmlns="">
+      <p15:sldGuideLst xmlns="" xmlns:p15="http://schemas.microsoft.com/office/powerpoint/2012/main">
         <p15:guide id="1" orient="horz" pos="2160">
           <p15:clr>
             <a:srgbClr val="A4A3A4"/>
@@ -212,7 +216,7 @@
           <a:p>
             <a:fld id="{24720111-BA70-4E3D-B1D7-15F2563EF00A}" type="datetimeFigureOut">
               <a:rPr lang="en-US" smtClean="0"/>
-              <a:t>5/1/2017</a:t>
+              <a:t>5/29/2017</a:t>
             </a:fld>
             <a:endParaRPr lang="en-US"/>
           </a:p>
@@ -667,7 +671,7 @@
           <a:p>
             <a:fld id="{C80F2D97-A948-4461-8760-8C9CAD7AE36A}" type="datetime1">
               <a:rPr lang="en-US" smtClean="0"/>
-              <a:t>5/1/2017</a:t>
+              <a:t>5/29/2017</a:t>
             </a:fld>
             <a:endParaRPr lang="en-US" dirty="0"/>
           </a:p>
@@ -881,7 +885,7 @@
           <a:p>
             <a:fld id="{47FCCFE7-4662-4EDA-9560-CEC3B329F522}" type="datetime1">
               <a:rPr lang="en-US" smtClean="0"/>
-              <a:t>5/1/2017</a:t>
+              <a:t>5/29/2017</a:t>
             </a:fld>
             <a:endParaRPr lang="en-US" dirty="0"/>
           </a:p>
@@ -1072,7 +1076,7 @@
           <a:p>
             <a:fld id="{557177F7-9B9F-4089-892D-410942DF4387}" type="datetime1">
               <a:rPr lang="en-US" smtClean="0"/>
-              <a:t>5/1/2017</a:t>
+              <a:t>5/29/2017</a:t>
             </a:fld>
             <a:endParaRPr lang="en-US" dirty="0"/>
           </a:p>
@@ -1252,7 +1256,7 @@
           <a:p>
             <a:fld id="{67DDF309-9F78-4AA5-90D1-88B0130F1157}" type="datetime1">
               <a:rPr lang="en-US" smtClean="0"/>
-              <a:t>5/1/2017</a:t>
+              <a:t>5/29/2017</a:t>
             </a:fld>
             <a:endParaRPr lang="en-US" dirty="0"/>
           </a:p>
@@ -1516,7 +1520,7 @@
           <a:p>
             <a:fld id="{50BF1498-852D-4EAC-AFD4-09D6F4A97870}" type="datetime1">
               <a:rPr lang="en-US" smtClean="0"/>
-              <a:t>5/1/2017</a:t>
+              <a:t>5/29/2017</a:t>
             </a:fld>
             <a:endParaRPr lang="en-US" dirty="0"/>
           </a:p>
@@ -1849,7 +1853,7 @@
           <a:p>
             <a:fld id="{D57BBD6D-6A2A-400A-BA35-20D52CE37080}" type="datetime1">
               <a:rPr lang="en-US" smtClean="0"/>
-              <a:t>5/1/2017</a:t>
+              <a:t>5/29/2017</a:t>
             </a:fld>
             <a:endParaRPr lang="en-US" dirty="0"/>
           </a:p>
@@ -2331,7 +2335,7 @@
           <a:p>
             <a:fld id="{8DD8FEAE-8B70-4752-9B3F-71B430B62F9D}" type="datetime1">
               <a:rPr lang="en-US" smtClean="0"/>
-              <a:t>5/1/2017</a:t>
+              <a:t>5/29/2017</a:t>
             </a:fld>
             <a:endParaRPr lang="en-US" dirty="0"/>
           </a:p>
@@ -2494,7 +2498,7 @@
           <a:p>
             <a:fld id="{F541F196-52FD-4595-AC9E-866A9D77A7C8}" type="datetime1">
               <a:rPr lang="en-US" smtClean="0"/>
-              <a:t>5/1/2017</a:t>
+              <a:t>5/29/2017</a:t>
             </a:fld>
             <a:endParaRPr lang="en-US" dirty="0"/>
           </a:p>
@@ -2600,7 +2604,7 @@
           <a:p>
             <a:fld id="{675EC49A-732F-441D-978A-85BAFBDE8CC5}" type="datetime1">
               <a:rPr lang="en-US" smtClean="0"/>
-              <a:t>5/1/2017</a:t>
+              <a:t>5/29/2017</a:t>
             </a:fld>
             <a:endParaRPr lang="en-US" dirty="0"/>
           </a:p>
@@ -2890,7 +2894,7 @@
           <a:p>
             <a:fld id="{260FF25B-A5C5-46CD-96FA-9AC449F8500C}" type="datetime1">
               <a:rPr lang="en-US" smtClean="0"/>
-              <a:t>5/1/2017</a:t>
+              <a:t>5/29/2017</a:t>
             </a:fld>
             <a:endParaRPr lang="en-US" dirty="0"/>
           </a:p>
@@ -3211,7 +3215,7 @@
           <a:p>
             <a:fld id="{6DD983F2-CB39-4E55-8D3D-E56E1D82FD10}" type="datetime1">
               <a:rPr lang="en-US" smtClean="0"/>
-              <a:t>5/1/2017</a:t>
+              <a:t>5/29/2017</a:t>
             </a:fld>
             <a:endParaRPr lang="en-US" dirty="0"/>
           </a:p>
@@ -3525,7 +3529,7 @@
           <a:p>
             <a:fld id="{4543C077-07B5-484F-B108-76CA5CECA42B}" type="datetime1">
               <a:rPr lang="en-US" smtClean="0"/>
-              <a:t>5/1/2017</a:t>
+              <a:t>5/29/2017</a:t>
             </a:fld>
             <a:endParaRPr lang="en-US" dirty="0"/>
           </a:p>
@@ -4636,13 +4640,24 @@
         <p:spPr/>
         <p:txBody>
           <a:bodyPr numCol="2">
-            <a:normAutofit lnSpcReduction="10000"/>
+            <a:normAutofit fontScale="92500" lnSpcReduction="10000"/>
           </a:bodyPr>
           <a:lstStyle/>
           <a:p>
             <a:r>
               <a:rPr lang="en-CA" dirty="0" smtClean="0"/>
-              <a:t>IAM - Identity Management 101</a:t>
+              <a:t>IAM Overview</a:t>
+            </a:r>
+            <a:endParaRPr lang="en-CA" dirty="0"/>
+          </a:p>
+          <a:p>
+            <a:r>
+              <a:rPr lang="en-CA" dirty="0" smtClean="0"/>
+              <a:t>Identity </a:t>
+            </a:r>
+            <a:r>
+              <a:rPr lang="en-CA" dirty="0" smtClean="0"/>
+              <a:t>Management 101</a:t>
             </a:r>
           </a:p>
           <a:p>
@@ -4676,7 +4691,11 @@
           <a:p>
             <a:r>
               <a:rPr lang="en-CA" dirty="0" smtClean="0"/>
-              <a:t>IAM - Access Management 101</a:t>
+              <a:t>Access </a:t>
+            </a:r>
+            <a:r>
+              <a:rPr lang="en-CA" dirty="0" smtClean="0"/>
+              <a:t>Management 101</a:t>
             </a:r>
           </a:p>
           <a:p>
@@ -4866,6 +4885,887 @@
       </p:par>
     </p:tnLst>
   </p:timing>
+</p:sld>
+</file>
+
+<file path=ppt/slides/slide6.xml><?xml version="1.0" encoding="utf-8"?>
+<p:sld xmlns:a="http://schemas.openxmlformats.org/drawingml/2006/main" xmlns:r="http://schemas.openxmlformats.org/officeDocument/2006/relationships" xmlns:p="http://schemas.openxmlformats.org/presentationml/2006/main">
+  <p:cSld>
+    <p:spTree>
+      <p:nvGrpSpPr>
+        <p:cNvPr id="1" name=""/>
+        <p:cNvGrpSpPr/>
+        <p:nvPr/>
+      </p:nvGrpSpPr>
+      <p:grpSpPr>
+        <a:xfrm>
+          <a:off x="0" y="0"/>
+          <a:ext cx="0" cy="0"/>
+          <a:chOff x="0" y="0"/>
+          <a:chExt cx="0" cy="0"/>
+        </a:xfrm>
+      </p:grpSpPr>
+      <p:sp>
+        <p:nvSpPr>
+          <p:cNvPr id="2" name="Title 1"/>
+          <p:cNvSpPr>
+            <a:spLocks noGrp="1"/>
+          </p:cNvSpPr>
+          <p:nvPr>
+            <p:ph type="title"/>
+          </p:nvPr>
+        </p:nvSpPr>
+        <p:spPr/>
+        <p:txBody>
+          <a:bodyPr/>
+          <a:lstStyle/>
+          <a:p>
+            <a:r>
+              <a:rPr lang="en-US" dirty="0" smtClean="0"/>
+              <a:t>IAM Overview</a:t>
+            </a:r>
+            <a:endParaRPr lang="en-US" dirty="0"/>
+          </a:p>
+        </p:txBody>
+      </p:sp>
+      <p:sp>
+        <p:nvSpPr>
+          <p:cNvPr id="3" name="Content Placeholder 2"/>
+          <p:cNvSpPr>
+            <a:spLocks noGrp="1"/>
+          </p:cNvSpPr>
+          <p:nvPr>
+            <p:ph idx="1"/>
+          </p:nvPr>
+        </p:nvSpPr>
+        <p:spPr>
+          <a:xfrm>
+            <a:off x="609600" y="1600200"/>
+            <a:ext cx="10972800" cy="5090886"/>
+          </a:xfrm>
+        </p:spPr>
+        <p:txBody>
+          <a:bodyPr>
+            <a:normAutofit lnSpcReduction="10000"/>
+          </a:bodyPr>
+          <a:lstStyle/>
+          <a:p>
+            <a:r>
+              <a:rPr lang="en-US" dirty="0" smtClean="0"/>
+              <a:t>What is IAM</a:t>
+            </a:r>
+          </a:p>
+          <a:p>
+            <a:pPr lvl="1"/>
+            <a:r>
+              <a:rPr lang="en-US" dirty="0" smtClean="0"/>
+              <a:t>AWS IAM manages Users and their level of access to AWS console.</a:t>
+            </a:r>
+          </a:p>
+          <a:p>
+            <a:r>
+              <a:rPr lang="en-US" dirty="0" smtClean="0"/>
+              <a:t>IAM essentials</a:t>
+            </a:r>
+          </a:p>
+          <a:p>
+            <a:pPr lvl="1"/>
+            <a:r>
+              <a:rPr lang="en-US" dirty="0" smtClean="0"/>
+              <a:t>IAM is global</a:t>
+            </a:r>
+          </a:p>
+          <a:p>
+            <a:pPr lvl="1"/>
+            <a:r>
+              <a:rPr lang="en-US" dirty="0" smtClean="0"/>
+              <a:t>Completely free</a:t>
+            </a:r>
+          </a:p>
+          <a:p>
+            <a:pPr lvl="1"/>
+            <a:r>
+              <a:rPr lang="en-US" dirty="0" smtClean="0"/>
+              <a:t>Centralized control of your AWS account</a:t>
+            </a:r>
+          </a:p>
+          <a:p>
+            <a:pPr lvl="1"/>
+            <a:r>
+              <a:rPr lang="en-US" dirty="0" smtClean="0"/>
+              <a:t>Shared Access to your AWS account</a:t>
+            </a:r>
+          </a:p>
+          <a:p>
+            <a:pPr lvl="1"/>
+            <a:r>
+              <a:rPr lang="en-US" dirty="0" smtClean="0"/>
+              <a:t>Granular Permissions</a:t>
+            </a:r>
+          </a:p>
+          <a:p>
+            <a:pPr lvl="1"/>
+            <a:r>
+              <a:rPr lang="en-US" dirty="0" smtClean="0"/>
+              <a:t>Identity Federation (Including Active Directory, Facebook, </a:t>
+            </a:r>
+            <a:r>
+              <a:rPr lang="en-US" dirty="0" err="1" smtClean="0"/>
+              <a:t>Linkedin</a:t>
+            </a:r>
+            <a:r>
+              <a:rPr lang="en-US" dirty="0" smtClean="0"/>
+              <a:t> </a:t>
+            </a:r>
+            <a:r>
+              <a:rPr lang="en-US" dirty="0" err="1" smtClean="0"/>
+              <a:t>etc</a:t>
+            </a:r>
+            <a:r>
+              <a:rPr lang="en-US" dirty="0" smtClean="0"/>
+              <a:t>)</a:t>
+            </a:r>
+          </a:p>
+          <a:p>
+            <a:pPr lvl="1"/>
+            <a:r>
+              <a:rPr lang="en-US" dirty="0" smtClean="0"/>
+              <a:t>Multifactor Authentication (MFA)</a:t>
+            </a:r>
+          </a:p>
+          <a:p>
+            <a:pPr lvl="1"/>
+            <a:r>
+              <a:rPr lang="en-US" dirty="0" smtClean="0"/>
+              <a:t>Provide temporary access for users/devices and services where necessary</a:t>
+            </a:r>
+          </a:p>
+          <a:p>
+            <a:pPr lvl="1"/>
+            <a:r>
+              <a:rPr lang="en-US" dirty="0" smtClean="0"/>
+              <a:t>Set up password rotation policy</a:t>
+            </a:r>
+          </a:p>
+          <a:p>
+            <a:pPr lvl="1"/>
+            <a:r>
+              <a:rPr lang="en-US" dirty="0" smtClean="0"/>
+              <a:t>Integrate with many different AWS services</a:t>
+            </a:r>
+          </a:p>
+          <a:p>
+            <a:pPr lvl="1"/>
+            <a:r>
+              <a:rPr lang="en-US" dirty="0" smtClean="0"/>
+              <a:t>Supports PCI DSS compliance</a:t>
+            </a:r>
+            <a:endParaRPr lang="en-US" dirty="0"/>
+          </a:p>
+        </p:txBody>
+      </p:sp>
+      <p:sp>
+        <p:nvSpPr>
+          <p:cNvPr id="4" name="Footer Placeholder 3"/>
+          <p:cNvSpPr>
+            <a:spLocks noGrp="1"/>
+          </p:cNvSpPr>
+          <p:nvPr>
+            <p:ph type="ftr" sz="quarter" idx="11"/>
+          </p:nvPr>
+        </p:nvSpPr>
+        <p:spPr/>
+        <p:txBody>
+          <a:bodyPr/>
+          <a:lstStyle/>
+          <a:p>
+            <a:r>
+              <a:rPr lang="en-US" smtClean="0"/>
+              <a:t>Lesson 1: Cloud Computing and AWS Overview</a:t>
+            </a:r>
+            <a:endParaRPr lang="en-US" dirty="0"/>
+          </a:p>
+        </p:txBody>
+      </p:sp>
+      <p:sp>
+        <p:nvSpPr>
+          <p:cNvPr id="5" name="Slide Number Placeholder 4"/>
+          <p:cNvSpPr>
+            <a:spLocks noGrp="1"/>
+          </p:cNvSpPr>
+          <p:nvPr>
+            <p:ph type="sldNum" sz="quarter" idx="12"/>
+          </p:nvPr>
+        </p:nvSpPr>
+        <p:spPr/>
+        <p:txBody>
+          <a:bodyPr/>
+          <a:lstStyle/>
+          <a:p>
+            <a:fld id="{6D22F896-40B5-4ADD-8801-0D06FADFA095}" type="slidenum">
+              <a:rPr lang="en-US" smtClean="0"/>
+              <a:t>6</a:t>
+            </a:fld>
+            <a:endParaRPr lang="en-US" dirty="0"/>
+          </a:p>
+        </p:txBody>
+      </p:sp>
+    </p:spTree>
+    <p:extLst>
+      <p:ext uri="{BB962C8B-B14F-4D97-AF65-F5344CB8AC3E}">
+        <p14:creationId xmlns:p14="http://schemas.microsoft.com/office/powerpoint/2010/main" val="3620025740"/>
+      </p:ext>
+    </p:extLst>
+  </p:cSld>
+  <p:clrMapOvr>
+    <a:masterClrMapping/>
+  </p:clrMapOvr>
+  <mc:AlternateContent xmlns:mc="http://schemas.openxmlformats.org/markup-compatibility/2006" xmlns:p14="http://schemas.microsoft.com/office/powerpoint/2010/main">
+    <mc:Choice Requires="p14">
+      <p:transition spd="med" p14:dur="700">
+        <p:fade/>
+      </p:transition>
+    </mc:Choice>
+    <mc:Fallback xmlns="">
+      <p:transition spd="med">
+        <p:fade/>
+      </p:transition>
+    </mc:Fallback>
+  </mc:AlternateContent>
+</p:sld>
+</file>
+
+<file path=ppt/slides/slide7.xml><?xml version="1.0" encoding="utf-8"?>
+<p:sld xmlns:a="http://schemas.openxmlformats.org/drawingml/2006/main" xmlns:r="http://schemas.openxmlformats.org/officeDocument/2006/relationships" xmlns:p="http://schemas.openxmlformats.org/presentationml/2006/main">
+  <p:cSld>
+    <p:spTree>
+      <p:nvGrpSpPr>
+        <p:cNvPr id="1" name=""/>
+        <p:cNvGrpSpPr/>
+        <p:nvPr/>
+      </p:nvGrpSpPr>
+      <p:grpSpPr>
+        <a:xfrm>
+          <a:off x="0" y="0"/>
+          <a:ext cx="0" cy="0"/>
+          <a:chOff x="0" y="0"/>
+          <a:chExt cx="0" cy="0"/>
+        </a:xfrm>
+      </p:grpSpPr>
+      <p:sp>
+        <p:nvSpPr>
+          <p:cNvPr id="2" name="Title 1"/>
+          <p:cNvSpPr>
+            <a:spLocks noGrp="1"/>
+          </p:cNvSpPr>
+          <p:nvPr>
+            <p:ph type="title"/>
+          </p:nvPr>
+        </p:nvSpPr>
+        <p:spPr/>
+        <p:txBody>
+          <a:bodyPr/>
+          <a:lstStyle/>
+          <a:p>
+            <a:r>
+              <a:rPr lang="en-US" dirty="0" smtClean="0"/>
+              <a:t>Identity Management - Users</a:t>
+            </a:r>
+            <a:endParaRPr lang="en-US" dirty="0"/>
+          </a:p>
+        </p:txBody>
+      </p:sp>
+      <p:sp>
+        <p:nvSpPr>
+          <p:cNvPr id="3" name="Content Placeholder 2"/>
+          <p:cNvSpPr>
+            <a:spLocks noGrp="1"/>
+          </p:cNvSpPr>
+          <p:nvPr>
+            <p:ph idx="1"/>
+          </p:nvPr>
+        </p:nvSpPr>
+        <p:spPr>
+          <a:xfrm>
+            <a:off x="609600" y="1600200"/>
+            <a:ext cx="10972800" cy="5090886"/>
+          </a:xfrm>
+        </p:spPr>
+        <p:txBody>
+          <a:bodyPr>
+            <a:normAutofit fontScale="77500" lnSpcReduction="20000"/>
+          </a:bodyPr>
+          <a:lstStyle/>
+          <a:p>
+            <a:r>
+              <a:rPr lang="en-US" sz="2500" b="1" dirty="0" smtClean="0"/>
+              <a:t>An IAM user is an entity that you create in AWS to represent the person or service that uses it to interact with AWS</a:t>
+            </a:r>
+          </a:p>
+          <a:p>
+            <a:endParaRPr lang="en-US" sz="2500" b="1" dirty="0" smtClean="0"/>
+          </a:p>
+          <a:p>
+            <a:r>
+              <a:rPr lang="en-US" sz="2500" b="1" dirty="0" smtClean="0"/>
+              <a:t>User Identification:</a:t>
+            </a:r>
+          </a:p>
+          <a:p>
+            <a:pPr lvl="1"/>
+            <a:r>
+              <a:rPr lang="en-US" sz="2300" dirty="0" smtClean="0"/>
+              <a:t>A “friendly name” for the user(Bob or Alex)</a:t>
+            </a:r>
+          </a:p>
+          <a:p>
+            <a:pPr lvl="1"/>
+            <a:r>
+              <a:rPr lang="en-US" sz="2300" dirty="0" smtClean="0"/>
+              <a:t>An Amazon Resource Name (ARN) – </a:t>
+            </a:r>
+            <a:r>
+              <a:rPr lang="en-US" sz="2300" dirty="0" err="1" smtClean="0"/>
+              <a:t>arn:partition:service:region:account:resource</a:t>
+            </a:r>
+            <a:endParaRPr lang="en-US" sz="2300" dirty="0" smtClean="0"/>
+          </a:p>
+          <a:p>
+            <a:pPr lvl="2"/>
+            <a:r>
+              <a:rPr lang="en-US" sz="2300" dirty="0" smtClean="0"/>
+              <a:t>e.g. </a:t>
+            </a:r>
+            <a:r>
+              <a:rPr lang="en-US" sz="2300" dirty="0" err="1" smtClean="0"/>
+              <a:t>arn:aws:iam</a:t>
+            </a:r>
+            <a:r>
+              <a:rPr lang="en-US" sz="2300" dirty="0" smtClean="0"/>
+              <a:t>::</a:t>
+            </a:r>
+            <a:r>
+              <a:rPr lang="en-US" sz="2300" dirty="0" err="1" smtClean="0"/>
+              <a:t>account-id-without-hyphens:user</a:t>
+            </a:r>
+            <a:r>
+              <a:rPr lang="en-US" sz="2300" dirty="0" smtClean="0"/>
+              <a:t>/Bob (region is always blank)</a:t>
+            </a:r>
+          </a:p>
+          <a:p>
+            <a:pPr lvl="1"/>
+            <a:r>
+              <a:rPr lang="en-US" sz="2300" dirty="0" smtClean="0"/>
+              <a:t>Unique ID - AIDAJQABLZS4A3QDU576Q</a:t>
+            </a:r>
+          </a:p>
+          <a:p>
+            <a:pPr lvl="2"/>
+            <a:r>
+              <a:rPr lang="en-US" sz="2300" dirty="0" smtClean="0"/>
+              <a:t>Is not available from Console, can be retrieved via AWS CLI commands or IAM API calls</a:t>
+            </a:r>
+          </a:p>
+          <a:p>
+            <a:r>
+              <a:rPr lang="en-US" sz="2500" b="1" dirty="0" smtClean="0"/>
+              <a:t>Credentials</a:t>
+            </a:r>
+          </a:p>
+          <a:p>
+            <a:pPr lvl="1"/>
+            <a:r>
+              <a:rPr lang="en-US" sz="2300" dirty="0" smtClean="0"/>
+              <a:t>Console password – Password Policy</a:t>
+            </a:r>
+          </a:p>
+          <a:p>
+            <a:pPr lvl="1"/>
+            <a:r>
+              <a:rPr lang="en-US" sz="2300" dirty="0" smtClean="0"/>
+              <a:t>Access keys</a:t>
+            </a:r>
+          </a:p>
+          <a:p>
+            <a:pPr lvl="1"/>
+            <a:r>
+              <a:rPr lang="en-US" sz="2300" dirty="0" smtClean="0"/>
+              <a:t>SSH Keys</a:t>
+            </a:r>
+          </a:p>
+          <a:p>
+            <a:pPr lvl="1"/>
+            <a:r>
+              <a:rPr lang="en-US" sz="2300" dirty="0" smtClean="0"/>
+              <a:t>Server Certificates</a:t>
+            </a:r>
+          </a:p>
+          <a:p>
+            <a:r>
+              <a:rPr lang="en-US" sz="2500" b="1" dirty="0" smtClean="0"/>
+              <a:t>Multi-Factor Authentication(MFA) </a:t>
+            </a:r>
+          </a:p>
+          <a:p>
+            <a:pPr lvl="1"/>
+            <a:r>
+              <a:rPr lang="en-US" sz="2300" dirty="0" smtClean="0"/>
+              <a:t>Hardware Token Device </a:t>
+            </a:r>
+          </a:p>
+          <a:p>
+            <a:pPr lvl="1"/>
+            <a:r>
+              <a:rPr lang="en-US" sz="2300" dirty="0" smtClean="0"/>
+              <a:t>Virtual MFA Device</a:t>
+            </a:r>
+          </a:p>
+          <a:p>
+            <a:pPr lvl="1"/>
+            <a:r>
+              <a:rPr lang="en-US" sz="2300" dirty="0" smtClean="0"/>
+              <a:t>SMS</a:t>
+            </a:r>
+          </a:p>
+          <a:p>
+            <a:pPr lvl="2"/>
+            <a:endParaRPr lang="en-US" dirty="0" smtClean="0"/>
+          </a:p>
+          <a:p>
+            <a:pPr lvl="2"/>
+            <a:endParaRPr lang="en-US" dirty="0" smtClean="0"/>
+          </a:p>
+        </p:txBody>
+      </p:sp>
+      <p:sp>
+        <p:nvSpPr>
+          <p:cNvPr id="4" name="Footer Placeholder 3"/>
+          <p:cNvSpPr>
+            <a:spLocks noGrp="1"/>
+          </p:cNvSpPr>
+          <p:nvPr>
+            <p:ph type="ftr" sz="quarter" idx="11"/>
+          </p:nvPr>
+        </p:nvSpPr>
+        <p:spPr/>
+        <p:txBody>
+          <a:bodyPr/>
+          <a:lstStyle/>
+          <a:p>
+            <a:r>
+              <a:rPr lang="en-US" smtClean="0"/>
+              <a:t>Lesson 1: Cloud Computing and AWS Overview</a:t>
+            </a:r>
+            <a:endParaRPr lang="en-US" dirty="0"/>
+          </a:p>
+        </p:txBody>
+      </p:sp>
+      <p:sp>
+        <p:nvSpPr>
+          <p:cNvPr id="5" name="Slide Number Placeholder 4"/>
+          <p:cNvSpPr>
+            <a:spLocks noGrp="1"/>
+          </p:cNvSpPr>
+          <p:nvPr>
+            <p:ph type="sldNum" sz="quarter" idx="12"/>
+          </p:nvPr>
+        </p:nvSpPr>
+        <p:spPr/>
+        <p:txBody>
+          <a:bodyPr/>
+          <a:lstStyle/>
+          <a:p>
+            <a:fld id="{6D22F896-40B5-4ADD-8801-0D06FADFA095}" type="slidenum">
+              <a:rPr lang="en-US" smtClean="0"/>
+              <a:t>7</a:t>
+            </a:fld>
+            <a:endParaRPr lang="en-US" dirty="0"/>
+          </a:p>
+        </p:txBody>
+      </p:sp>
+    </p:spTree>
+    <p:extLst>
+      <p:ext uri="{BB962C8B-B14F-4D97-AF65-F5344CB8AC3E}">
+        <p14:creationId xmlns:p14="http://schemas.microsoft.com/office/powerpoint/2010/main" val="1916023137"/>
+      </p:ext>
+    </p:extLst>
+  </p:cSld>
+  <p:clrMapOvr>
+    <a:masterClrMapping/>
+  </p:clrMapOvr>
+  <mc:AlternateContent xmlns:mc="http://schemas.openxmlformats.org/markup-compatibility/2006" xmlns:p14="http://schemas.microsoft.com/office/powerpoint/2010/main">
+    <mc:Choice Requires="p14">
+      <p:transition spd="med" p14:dur="700">
+        <p:fade/>
+      </p:transition>
+    </mc:Choice>
+    <mc:Fallback xmlns="">
+      <p:transition spd="med">
+        <p:fade/>
+      </p:transition>
+    </mc:Fallback>
+  </mc:AlternateContent>
+</p:sld>
+</file>
+
+<file path=ppt/slides/slide8.xml><?xml version="1.0" encoding="utf-8"?>
+<p:sld xmlns:a="http://schemas.openxmlformats.org/drawingml/2006/main" xmlns:r="http://schemas.openxmlformats.org/officeDocument/2006/relationships" xmlns:p="http://schemas.openxmlformats.org/presentationml/2006/main">
+  <p:cSld>
+    <p:spTree>
+      <p:nvGrpSpPr>
+        <p:cNvPr id="1" name=""/>
+        <p:cNvGrpSpPr/>
+        <p:nvPr/>
+      </p:nvGrpSpPr>
+      <p:grpSpPr>
+        <a:xfrm>
+          <a:off x="0" y="0"/>
+          <a:ext cx="0" cy="0"/>
+          <a:chOff x="0" y="0"/>
+          <a:chExt cx="0" cy="0"/>
+        </a:xfrm>
+      </p:grpSpPr>
+      <p:sp>
+        <p:nvSpPr>
+          <p:cNvPr id="2" name="Title 1"/>
+          <p:cNvSpPr>
+            <a:spLocks noGrp="1"/>
+          </p:cNvSpPr>
+          <p:nvPr>
+            <p:ph type="title"/>
+          </p:nvPr>
+        </p:nvSpPr>
+        <p:spPr/>
+        <p:txBody>
+          <a:bodyPr/>
+          <a:lstStyle/>
+          <a:p>
+            <a:r>
+              <a:rPr lang="en-US" dirty="0" smtClean="0"/>
+              <a:t>Identity Management - Groups</a:t>
+            </a:r>
+            <a:endParaRPr lang="en-US" dirty="0"/>
+          </a:p>
+        </p:txBody>
+      </p:sp>
+      <p:sp>
+        <p:nvSpPr>
+          <p:cNvPr id="3" name="Content Placeholder 2"/>
+          <p:cNvSpPr>
+            <a:spLocks noGrp="1"/>
+          </p:cNvSpPr>
+          <p:nvPr>
+            <p:ph idx="1"/>
+          </p:nvPr>
+        </p:nvSpPr>
+        <p:spPr>
+          <a:xfrm>
+            <a:off x="609600" y="1600200"/>
+            <a:ext cx="7097486" cy="4876800"/>
+          </a:xfrm>
+        </p:spPr>
+        <p:txBody>
+          <a:bodyPr/>
+          <a:lstStyle/>
+          <a:p>
+            <a:r>
+              <a:rPr lang="en-US" dirty="0" smtClean="0"/>
+              <a:t>An IAM group is a collection of IAM users under one set of permissions</a:t>
+            </a:r>
+          </a:p>
+          <a:p>
+            <a:pPr lvl="1"/>
+            <a:r>
+              <a:rPr lang="en-US" dirty="0" smtClean="0"/>
+              <a:t>A group can contain many users, and a user can belong to many groups</a:t>
+            </a:r>
+          </a:p>
+          <a:p>
+            <a:pPr lvl="1"/>
+            <a:r>
+              <a:rPr lang="en-US" dirty="0" smtClean="0"/>
+              <a:t>Group cannot be nested, they can only contain users, not other groups</a:t>
+            </a:r>
+          </a:p>
+          <a:p>
+            <a:pPr lvl="1"/>
+            <a:r>
+              <a:rPr lang="en-US" dirty="0" smtClean="0"/>
+              <a:t>You can attach policy to an IAM group</a:t>
+            </a:r>
+          </a:p>
+          <a:p>
+            <a:pPr lvl="1"/>
+            <a:r>
+              <a:rPr lang="en-US" dirty="0" smtClean="0"/>
+              <a:t>AWS IAM has predefined groups</a:t>
+            </a:r>
+          </a:p>
+          <a:p>
+            <a:endParaRPr lang="en-US" dirty="0"/>
+          </a:p>
+        </p:txBody>
+      </p:sp>
+      <p:sp>
+        <p:nvSpPr>
+          <p:cNvPr id="4" name="Footer Placeholder 3"/>
+          <p:cNvSpPr>
+            <a:spLocks noGrp="1"/>
+          </p:cNvSpPr>
+          <p:nvPr>
+            <p:ph type="ftr" sz="quarter" idx="11"/>
+          </p:nvPr>
+        </p:nvSpPr>
+        <p:spPr/>
+        <p:txBody>
+          <a:bodyPr/>
+          <a:lstStyle/>
+          <a:p>
+            <a:r>
+              <a:rPr lang="en-US" smtClean="0"/>
+              <a:t>Lesson 1: Cloud Computing and AWS Overview</a:t>
+            </a:r>
+            <a:endParaRPr lang="en-US" dirty="0"/>
+          </a:p>
+        </p:txBody>
+      </p:sp>
+      <p:sp>
+        <p:nvSpPr>
+          <p:cNvPr id="5" name="Slide Number Placeholder 4"/>
+          <p:cNvSpPr>
+            <a:spLocks noGrp="1"/>
+          </p:cNvSpPr>
+          <p:nvPr>
+            <p:ph type="sldNum" sz="quarter" idx="12"/>
+          </p:nvPr>
+        </p:nvSpPr>
+        <p:spPr/>
+        <p:txBody>
+          <a:bodyPr/>
+          <a:lstStyle/>
+          <a:p>
+            <a:fld id="{6D22F896-40B5-4ADD-8801-0D06FADFA095}" type="slidenum">
+              <a:rPr lang="en-US" smtClean="0"/>
+              <a:t>8</a:t>
+            </a:fld>
+            <a:endParaRPr lang="en-US" dirty="0"/>
+          </a:p>
+        </p:txBody>
+      </p:sp>
+      <p:pic>
+        <p:nvPicPr>
+          <p:cNvPr id="1026" name="Picture 2"/>
+          <p:cNvPicPr>
+            <a:picLocks noChangeAspect="1" noChangeArrowheads="1"/>
+          </p:cNvPicPr>
+          <p:nvPr/>
+        </p:nvPicPr>
+        <p:blipFill>
+          <a:blip r:embed="rId2">
+            <a:extLst>
+              <a:ext uri="{28A0092B-C50C-407E-A947-70E740481C1C}">
+                <a14:useLocalDpi xmlns:a14="http://schemas.microsoft.com/office/drawing/2010/main" val="0"/>
+              </a:ext>
+            </a:extLst>
+          </a:blip>
+          <a:srcRect/>
+          <a:stretch>
+            <a:fillRect/>
+          </a:stretch>
+        </p:blipFill>
+        <p:spPr bwMode="auto">
+          <a:xfrm>
+            <a:off x="8174961" y="1262141"/>
+            <a:ext cx="3755781" cy="4885340"/>
+          </a:xfrm>
+          <a:prstGeom prst="rect">
+            <a:avLst/>
+          </a:prstGeom>
+          <a:noFill/>
+          <a:ln>
+            <a:noFill/>
+          </a:ln>
+          <a:extLst>
+            <a:ext uri="{909E8E84-426E-40DD-AFC4-6F175D3DCCD1}">
+              <a14:hiddenFill xmlns:a14="http://schemas.microsoft.com/office/drawing/2010/main">
+                <a:solidFill>
+                  <a:schemeClr val="accent1"/>
+                </a:solidFill>
+              </a14:hiddenFill>
+            </a:ext>
+            <a:ext uri="{91240B29-F687-4F45-9708-019B960494DF}">
+              <a14:hiddenLine xmlns:a14="http://schemas.microsoft.com/office/drawing/2010/main" w="9525">
+                <a:solidFill>
+                  <a:schemeClr val="tx1"/>
+                </a:solidFill>
+                <a:miter lim="800000"/>
+                <a:headEnd/>
+                <a:tailEnd/>
+              </a14:hiddenLine>
+            </a:ext>
+          </a:extLst>
+        </p:spPr>
+      </p:pic>
+    </p:spTree>
+    <p:extLst>
+      <p:ext uri="{BB962C8B-B14F-4D97-AF65-F5344CB8AC3E}">
+        <p14:creationId xmlns:p14="http://schemas.microsoft.com/office/powerpoint/2010/main" val="1344869088"/>
+      </p:ext>
+    </p:extLst>
+  </p:cSld>
+  <p:clrMapOvr>
+    <a:masterClrMapping/>
+  </p:clrMapOvr>
+  <mc:AlternateContent xmlns:mc="http://schemas.openxmlformats.org/markup-compatibility/2006" xmlns:p14="http://schemas.microsoft.com/office/powerpoint/2010/main">
+    <mc:Choice Requires="p14">
+      <p:transition spd="med" p14:dur="700">
+        <p:fade/>
+      </p:transition>
+    </mc:Choice>
+    <mc:Fallback xmlns="">
+      <p:transition spd="med">
+        <p:fade/>
+      </p:transition>
+    </mc:Fallback>
+  </mc:AlternateContent>
+</p:sld>
+</file>
+
+<file path=ppt/slides/slide9.xml><?xml version="1.0" encoding="utf-8"?>
+<p:sld xmlns:a="http://schemas.openxmlformats.org/drawingml/2006/main" xmlns:r="http://schemas.openxmlformats.org/officeDocument/2006/relationships" xmlns:p="http://schemas.openxmlformats.org/presentationml/2006/main">
+  <p:cSld>
+    <p:spTree>
+      <p:nvGrpSpPr>
+        <p:cNvPr id="1" name=""/>
+        <p:cNvGrpSpPr/>
+        <p:nvPr/>
+      </p:nvGrpSpPr>
+      <p:grpSpPr>
+        <a:xfrm>
+          <a:off x="0" y="0"/>
+          <a:ext cx="0" cy="0"/>
+          <a:chOff x="0" y="0"/>
+          <a:chExt cx="0" cy="0"/>
+        </a:xfrm>
+      </p:grpSpPr>
+      <p:sp>
+        <p:nvSpPr>
+          <p:cNvPr id="2" name="Title 1"/>
+          <p:cNvSpPr>
+            <a:spLocks noGrp="1"/>
+          </p:cNvSpPr>
+          <p:nvPr>
+            <p:ph type="title"/>
+          </p:nvPr>
+        </p:nvSpPr>
+        <p:spPr/>
+        <p:txBody>
+          <a:bodyPr/>
+          <a:lstStyle/>
+          <a:p>
+            <a:r>
+              <a:rPr lang="en-US" dirty="0" smtClean="0"/>
+              <a:t>Identity Management - Roles</a:t>
+            </a:r>
+            <a:endParaRPr lang="en-US" dirty="0"/>
+          </a:p>
+        </p:txBody>
+      </p:sp>
+      <p:sp>
+        <p:nvSpPr>
+          <p:cNvPr id="3" name="Content Placeholder 2"/>
+          <p:cNvSpPr>
+            <a:spLocks noGrp="1"/>
+          </p:cNvSpPr>
+          <p:nvPr>
+            <p:ph idx="1"/>
+          </p:nvPr>
+        </p:nvSpPr>
+        <p:spPr/>
+        <p:txBody>
+          <a:bodyPr/>
+          <a:lstStyle/>
+          <a:p>
+            <a:r>
+              <a:rPr lang="en-US" dirty="0" smtClean="0"/>
+              <a:t>An IAM Role is an AWS identity with permission policies that determine what the identity can and cannot do in AWS</a:t>
+            </a:r>
+          </a:p>
+          <a:p>
+            <a:pPr lvl="1"/>
+            <a:endParaRPr lang="en-US" dirty="0"/>
+          </a:p>
+        </p:txBody>
+      </p:sp>
+      <p:sp>
+        <p:nvSpPr>
+          <p:cNvPr id="4" name="Footer Placeholder 3"/>
+          <p:cNvSpPr>
+            <a:spLocks noGrp="1"/>
+          </p:cNvSpPr>
+          <p:nvPr>
+            <p:ph type="ftr" sz="quarter" idx="11"/>
+          </p:nvPr>
+        </p:nvSpPr>
+        <p:spPr/>
+        <p:txBody>
+          <a:bodyPr/>
+          <a:lstStyle/>
+          <a:p>
+            <a:r>
+              <a:rPr lang="en-US" smtClean="0"/>
+              <a:t>Lesson 1: Cloud Computing and AWS Overview</a:t>
+            </a:r>
+            <a:endParaRPr lang="en-US" dirty="0"/>
+          </a:p>
+        </p:txBody>
+      </p:sp>
+      <p:sp>
+        <p:nvSpPr>
+          <p:cNvPr id="5" name="Slide Number Placeholder 4"/>
+          <p:cNvSpPr>
+            <a:spLocks noGrp="1"/>
+          </p:cNvSpPr>
+          <p:nvPr>
+            <p:ph type="sldNum" sz="quarter" idx="12"/>
+          </p:nvPr>
+        </p:nvSpPr>
+        <p:spPr/>
+        <p:txBody>
+          <a:bodyPr/>
+          <a:lstStyle/>
+          <a:p>
+            <a:fld id="{6D22F896-40B5-4ADD-8801-0D06FADFA095}" type="slidenum">
+              <a:rPr lang="en-US" smtClean="0"/>
+              <a:t>9</a:t>
+            </a:fld>
+            <a:endParaRPr lang="en-US" dirty="0"/>
+          </a:p>
+        </p:txBody>
+      </p:sp>
+    </p:spTree>
+    <p:extLst>
+      <p:ext uri="{BB962C8B-B14F-4D97-AF65-F5344CB8AC3E}">
+        <p14:creationId xmlns:p14="http://schemas.microsoft.com/office/powerpoint/2010/main" val="976298186"/>
+      </p:ext>
+    </p:extLst>
+  </p:cSld>
+  <p:clrMapOvr>
+    <a:masterClrMapping/>
+  </p:clrMapOvr>
+  <mc:AlternateContent xmlns:mc="http://schemas.openxmlformats.org/markup-compatibility/2006" xmlns:p14="http://schemas.microsoft.com/office/powerpoint/2010/main">
+    <mc:Choice Requires="p14">
+      <p:transition spd="med" p14:dur="700">
+        <p:fade/>
+      </p:transition>
+    </mc:Choice>
+    <mc:Fallback xmlns="">
+      <p:transition spd="med">
+        <p:fade/>
+      </p:transition>
+    </mc:Fallback>
+  </mc:AlternateContent>
 </p:sld>
 </file>
 

</xml_diff>